<commit_message>
Add slides from 2018-02
</commit_message>
<xml_diff>
--- a/slides/2018-02-26-FT-Interop.pptx
+++ b/slides/2018-02-26-FT-Interop.pptx
@@ -246,7 +246,7 @@
           <a:p>
             <a:fld id="{E2593520-FD55-7B49-9493-2A983CF880CA}" type="datetimeFigureOut">
               <a:rPr lang="en-US" smtClean="0"/>
-              <a:t>2/21/18</a:t>
+              <a:t>2/27/18</a:t>
             </a:fld>
             <a:endParaRPr lang="en-US"/>
           </a:p>
@@ -414,7 +414,7 @@
           <a:p>
             <a:fld id="{E2593520-FD55-7B49-9493-2A983CF880CA}" type="datetimeFigureOut">
               <a:rPr lang="en-US" smtClean="0"/>
-              <a:t>2/21/18</a:t>
+              <a:t>2/27/18</a:t>
             </a:fld>
             <a:endParaRPr lang="en-US"/>
           </a:p>
@@ -592,7 +592,7 @@
           <a:p>
             <a:fld id="{E2593520-FD55-7B49-9493-2A983CF880CA}" type="datetimeFigureOut">
               <a:rPr lang="en-US" smtClean="0"/>
-              <a:t>2/21/18</a:t>
+              <a:t>2/27/18</a:t>
             </a:fld>
             <a:endParaRPr lang="en-US"/>
           </a:p>
@@ -760,7 +760,7 @@
           <a:p>
             <a:fld id="{E2593520-FD55-7B49-9493-2A983CF880CA}" type="datetimeFigureOut">
               <a:rPr lang="en-US" smtClean="0"/>
-              <a:t>2/21/18</a:t>
+              <a:t>2/27/18</a:t>
             </a:fld>
             <a:endParaRPr lang="en-US"/>
           </a:p>
@@ -1005,7 +1005,7 @@
           <a:p>
             <a:fld id="{E2593520-FD55-7B49-9493-2A983CF880CA}" type="datetimeFigureOut">
               <a:rPr lang="en-US" smtClean="0"/>
-              <a:t>2/21/18</a:t>
+              <a:t>2/27/18</a:t>
             </a:fld>
             <a:endParaRPr lang="en-US"/>
           </a:p>
@@ -1234,7 +1234,7 @@
           <a:p>
             <a:fld id="{E2593520-FD55-7B49-9493-2A983CF880CA}" type="datetimeFigureOut">
               <a:rPr lang="en-US" smtClean="0"/>
-              <a:t>2/21/18</a:t>
+              <a:t>2/27/18</a:t>
             </a:fld>
             <a:endParaRPr lang="en-US"/>
           </a:p>
@@ -1598,7 +1598,7 @@
           <a:p>
             <a:fld id="{E2593520-FD55-7B49-9493-2A983CF880CA}" type="datetimeFigureOut">
               <a:rPr lang="en-US" smtClean="0"/>
-              <a:t>2/21/18</a:t>
+              <a:t>2/27/18</a:t>
             </a:fld>
             <a:endParaRPr lang="en-US"/>
           </a:p>
@@ -1715,7 +1715,7 @@
           <a:p>
             <a:fld id="{E2593520-FD55-7B49-9493-2A983CF880CA}" type="datetimeFigureOut">
               <a:rPr lang="en-US" smtClean="0"/>
-              <a:t>2/21/18</a:t>
+              <a:t>2/27/18</a:t>
             </a:fld>
             <a:endParaRPr lang="en-US"/>
           </a:p>
@@ -1810,7 +1810,7 @@
           <a:p>
             <a:fld id="{E2593520-FD55-7B49-9493-2A983CF880CA}" type="datetimeFigureOut">
               <a:rPr lang="en-US" smtClean="0"/>
-              <a:t>2/21/18</a:t>
+              <a:t>2/27/18</a:t>
             </a:fld>
             <a:endParaRPr lang="en-US"/>
           </a:p>
@@ -2085,7 +2085,7 @@
           <a:p>
             <a:fld id="{E2593520-FD55-7B49-9493-2A983CF880CA}" type="datetimeFigureOut">
               <a:rPr lang="en-US" smtClean="0"/>
-              <a:t>2/21/18</a:t>
+              <a:t>2/27/18</a:t>
             </a:fld>
             <a:endParaRPr lang="en-US"/>
           </a:p>
@@ -2337,7 +2337,7 @@
           <a:p>
             <a:fld id="{E2593520-FD55-7B49-9493-2A983CF880CA}" type="datetimeFigureOut">
               <a:rPr lang="en-US" smtClean="0"/>
-              <a:t>2/21/18</a:t>
+              <a:t>2/27/18</a:t>
             </a:fld>
             <a:endParaRPr lang="en-US"/>
           </a:p>
@@ -2548,7 +2548,7 @@
           <a:p>
             <a:fld id="{E2593520-FD55-7B49-9493-2A983CF880CA}" type="datetimeFigureOut">
               <a:rPr lang="en-US" smtClean="0"/>
-              <a:t>2/21/18</a:t>
+              <a:t>2/27/18</a:t>
             </a:fld>
             <a:endParaRPr lang="en-US"/>
           </a:p>
@@ -3371,7 +3371,7 @@
         <p:spPr/>
         <p:txBody>
           <a:bodyPr>
-            <a:normAutofit fontScale="92500" lnSpcReduction="20000"/>
+            <a:normAutofit fontScale="92500" lnSpcReduction="10000"/>
           </a:bodyPr>
           <a:lstStyle/>
           <a:p>
@@ -3433,13 +3433,6 @@
             <a:r>
               <a:rPr lang="en-US" dirty="0"/>
               <a:t>If it’s not possible for the implementation to switch models, it is allowed to not do the switch (return the original model).</a:t>
-            </a:r>
-          </a:p>
-          <a:p>
-            <a:pPr lvl="1"/>
-            <a:r>
-              <a:rPr lang="en-US" dirty="0"/>
-              <a:t>This function is fault tolerant and will be able to complete successfully even if there are failures on MPI_COMM_WORLD.</a:t>
             </a:r>
           </a:p>
         </p:txBody>
@@ -3521,7 +3514,7 @@
         <p:spPr/>
         <p:txBody>
           <a:bodyPr>
-            <a:normAutofit/>
+            <a:normAutofit lnSpcReduction="10000"/>
           </a:bodyPr>
           <a:lstStyle/>
           <a:p>
@@ -3554,8 +3547,29 @@
           <a:p>
             <a:pPr lvl="2"/>
             <a:r>
+              <a:rPr lang="en-US" b="1" dirty="0"/>
+              <a:t>Option 2: Allow processes only connected by </a:t>
+            </a:r>
+            <a:r>
+              <a:rPr lang="en-US" b="1" dirty="0" err="1"/>
+              <a:t>intercommunicators</a:t>
+            </a:r>
+            <a:r>
+              <a:rPr lang="en-US" b="1" dirty="0"/>
+              <a:t> to have distinct FT models.</a:t>
+            </a:r>
+          </a:p>
+          <a:p>
+            <a:r>
               <a:rPr lang="en-US" dirty="0"/>
-              <a:t>Option 2: Allow processes only connected by </a:t>
+              <a:t>How do we allow multiple models when they are compatible together?</a:t>
+            </a:r>
+          </a:p>
+          <a:p>
+            <a:pPr lvl="1"/>
+            <a:r>
+              <a:rPr lang="en-US" dirty="0"/>
+              <a:t>Both across </a:t>
             </a:r>
             <a:r>
               <a:rPr lang="en-US" dirty="0" err="1"/>
@@ -3563,7 +3577,15 @@
             </a:r>
             <a:r>
               <a:rPr lang="en-US" dirty="0"/>
-              <a:t> to have distinct FT models.</a:t>
+              <a:t> and within an </a:t>
+            </a:r>
+            <a:r>
+              <a:rPr lang="en-US" dirty="0" err="1"/>
+              <a:t>intracommunicator</a:t>
+            </a:r>
+            <a:r>
+              <a:rPr lang="en-US" dirty="0"/>
+              <a:t> (MPI_COMM_WORLD).</a:t>
             </a:r>
           </a:p>
         </p:txBody>

</xml_diff>